<commit_message>
update last document version
</commit_message>
<xml_diff>
--- a/Documents/Books/trunk/materials/material.pptx
+++ b/Documents/Books/trunk/materials/material.pptx
@@ -196,7 +196,7 @@
             <a:fld id="{09F19A43-9A6E-436D-AC69-AF2319A0FFB3}" type="datetimeFigureOut">
               <a:rPr lang="ko-KR" altLang="en-US" smtClean="0"/>
               <a:pPr/>
-              <a:t>2010-08-24</a:t>
+              <a:t>2010-08-25</a:t>
             </a:fld>
             <a:endParaRPr lang="ko-KR" altLang="en-US"/>
           </a:p>
@@ -972,7 +972,7 @@
             <a:fld id="{5B197AB2-7419-47F9-AD92-8034AC3CF8F7}" type="datetimeFigureOut">
               <a:rPr lang="ko-KR" altLang="en-US" smtClean="0"/>
               <a:pPr/>
-              <a:t>2010-08-24</a:t>
+              <a:t>2010-08-25</a:t>
             </a:fld>
             <a:endParaRPr lang="ko-KR" altLang="en-US"/>
           </a:p>
@@ -1139,7 +1139,7 @@
             <a:fld id="{5B197AB2-7419-47F9-AD92-8034AC3CF8F7}" type="datetimeFigureOut">
               <a:rPr lang="ko-KR" altLang="en-US" smtClean="0"/>
               <a:pPr/>
-              <a:t>2010-08-24</a:t>
+              <a:t>2010-08-25</a:t>
             </a:fld>
             <a:endParaRPr lang="ko-KR" altLang="en-US"/>
           </a:p>
@@ -1316,7 +1316,7 @@
             <a:fld id="{5B197AB2-7419-47F9-AD92-8034AC3CF8F7}" type="datetimeFigureOut">
               <a:rPr lang="ko-KR" altLang="en-US" smtClean="0"/>
               <a:pPr/>
-              <a:t>2010-08-24</a:t>
+              <a:t>2010-08-25</a:t>
             </a:fld>
             <a:endParaRPr lang="ko-KR" altLang="en-US"/>
           </a:p>
@@ -1483,7 +1483,7 @@
             <a:fld id="{5B197AB2-7419-47F9-AD92-8034AC3CF8F7}" type="datetimeFigureOut">
               <a:rPr lang="ko-KR" altLang="en-US" smtClean="0"/>
               <a:pPr/>
-              <a:t>2010-08-24</a:t>
+              <a:t>2010-08-25</a:t>
             </a:fld>
             <a:endParaRPr lang="ko-KR" altLang="en-US"/>
           </a:p>
@@ -1726,7 +1726,7 @@
             <a:fld id="{5B197AB2-7419-47F9-AD92-8034AC3CF8F7}" type="datetimeFigureOut">
               <a:rPr lang="ko-KR" altLang="en-US" smtClean="0"/>
               <a:pPr/>
-              <a:t>2010-08-24</a:t>
+              <a:t>2010-08-25</a:t>
             </a:fld>
             <a:endParaRPr lang="ko-KR" altLang="en-US"/>
           </a:p>
@@ -2011,7 +2011,7 @@
             <a:fld id="{5B197AB2-7419-47F9-AD92-8034AC3CF8F7}" type="datetimeFigureOut">
               <a:rPr lang="ko-KR" altLang="en-US" smtClean="0"/>
               <a:pPr/>
-              <a:t>2010-08-24</a:t>
+              <a:t>2010-08-25</a:t>
             </a:fld>
             <a:endParaRPr lang="ko-KR" altLang="en-US"/>
           </a:p>
@@ -2430,7 +2430,7 @@
             <a:fld id="{5B197AB2-7419-47F9-AD92-8034AC3CF8F7}" type="datetimeFigureOut">
               <a:rPr lang="ko-KR" altLang="en-US" smtClean="0"/>
               <a:pPr/>
-              <a:t>2010-08-24</a:t>
+              <a:t>2010-08-25</a:t>
             </a:fld>
             <a:endParaRPr lang="ko-KR" altLang="en-US"/>
           </a:p>
@@ -2545,7 +2545,7 @@
             <a:fld id="{5B197AB2-7419-47F9-AD92-8034AC3CF8F7}" type="datetimeFigureOut">
               <a:rPr lang="ko-KR" altLang="en-US" smtClean="0"/>
               <a:pPr/>
-              <a:t>2010-08-24</a:t>
+              <a:t>2010-08-25</a:t>
             </a:fld>
             <a:endParaRPr lang="ko-KR" altLang="en-US"/>
           </a:p>
@@ -2637,7 +2637,7 @@
             <a:fld id="{5B197AB2-7419-47F9-AD92-8034AC3CF8F7}" type="datetimeFigureOut">
               <a:rPr lang="ko-KR" altLang="en-US" smtClean="0"/>
               <a:pPr/>
-              <a:t>2010-08-24</a:t>
+              <a:t>2010-08-25</a:t>
             </a:fld>
             <a:endParaRPr lang="ko-KR" altLang="en-US"/>
           </a:p>
@@ -2911,7 +2911,7 @@
             <a:fld id="{5B197AB2-7419-47F9-AD92-8034AC3CF8F7}" type="datetimeFigureOut">
               <a:rPr lang="ko-KR" altLang="en-US" smtClean="0"/>
               <a:pPr/>
-              <a:t>2010-08-24</a:t>
+              <a:t>2010-08-25</a:t>
             </a:fld>
             <a:endParaRPr lang="ko-KR" altLang="en-US"/>
           </a:p>
@@ -3161,7 +3161,7 @@
             <a:fld id="{5B197AB2-7419-47F9-AD92-8034AC3CF8F7}" type="datetimeFigureOut">
               <a:rPr lang="ko-KR" altLang="en-US" smtClean="0"/>
               <a:pPr/>
-              <a:t>2010-08-24</a:t>
+              <a:t>2010-08-25</a:t>
             </a:fld>
             <a:endParaRPr lang="ko-KR" altLang="en-US"/>
           </a:p>
@@ -3373,7 +3373,7 @@
             <a:fld id="{5B197AB2-7419-47F9-AD92-8034AC3CF8F7}" type="datetimeFigureOut">
               <a:rPr lang="ko-KR" altLang="en-US" smtClean="0"/>
               <a:pPr/>
-              <a:t>2010-08-24</a:t>
+              <a:t>2010-08-25</a:t>
             </a:fld>
             <a:endParaRPr lang="ko-KR" altLang="en-US"/>
           </a:p>
@@ -4020,358 +4020,373 @@
           <a:chExt cx="0" cy="0"/>
         </a:xfrm>
       </p:grpSpPr>
-      <p:cxnSp>
-        <p:nvCxnSpPr>
-          <p:cNvPr id="7" name="Straight Arrow Connector 6"/>
-          <p:cNvCxnSpPr/>
+      <p:grpSp>
+        <p:nvGrpSpPr>
+          <p:cNvPr id="21" name="Group 20"/>
+          <p:cNvGrpSpPr/>
           <p:nvPr/>
-        </p:nvCxnSpPr>
-        <p:spPr>
-          <a:xfrm flipV="1">
-            <a:off x="275270" y="2144731"/>
-            <a:ext cx="3600400" cy="2808312"/>
+        </p:nvGrpSpPr>
+        <p:grpSpPr>
+          <a:xfrm>
+            <a:off x="275270" y="1256127"/>
+            <a:ext cx="7967163" cy="3913569"/>
+            <a:chOff x="275270" y="1256127"/>
+            <a:chExt cx="7967163" cy="3913569"/>
           </a:xfrm>
-          <a:prstGeom prst="straightConnector1">
-            <a:avLst/>
-          </a:prstGeom>
-          <a:ln>
-            <a:tailEnd type="arrow" w="lg" len="lg"/>
-          </a:ln>
-        </p:spPr>
-        <p:style>
-          <a:lnRef idx="2">
-            <a:schemeClr val="dk1"/>
-          </a:lnRef>
-          <a:fillRef idx="0">
-            <a:schemeClr val="dk1"/>
-          </a:fillRef>
-          <a:effectRef idx="1">
-            <a:schemeClr val="dk1"/>
-          </a:effectRef>
-          <a:fontRef idx="minor">
-            <a:schemeClr val="tx1"/>
-          </a:fontRef>
-        </p:style>
-      </p:cxnSp>
-      <p:cxnSp>
-        <p:nvCxnSpPr>
-          <p:cNvPr id="8" name="Straight Arrow Connector 7"/>
-          <p:cNvCxnSpPr/>
-          <p:nvPr/>
-        </p:nvCxnSpPr>
-        <p:spPr>
-          <a:xfrm rot="5400000" flipH="1" flipV="1">
-            <a:off x="900386" y="2407461"/>
-            <a:ext cx="2304256" cy="1588"/>
-          </a:xfrm>
-          <a:prstGeom prst="straightConnector1">
-            <a:avLst/>
-          </a:prstGeom>
-          <a:ln>
-            <a:tailEnd type="arrow" w="lg" len="lg"/>
-          </a:ln>
-        </p:spPr>
-        <p:style>
-          <a:lnRef idx="2">
-            <a:schemeClr val="dk1"/>
-          </a:lnRef>
-          <a:fillRef idx="0">
-            <a:schemeClr val="dk1"/>
-          </a:fillRef>
-          <a:effectRef idx="1">
-            <a:schemeClr val="dk1"/>
-          </a:effectRef>
-          <a:fontRef idx="minor">
-            <a:schemeClr val="tx1"/>
-          </a:fontRef>
-        </p:style>
-      </p:cxnSp>
-      <p:cxnSp>
-        <p:nvCxnSpPr>
-          <p:cNvPr id="10" name="Straight Arrow Connector 9"/>
-          <p:cNvCxnSpPr/>
-          <p:nvPr/>
-        </p:nvCxnSpPr>
-        <p:spPr>
-          <a:xfrm>
-            <a:off x="2063595" y="3561141"/>
-            <a:ext cx="2796437" cy="1588"/>
-          </a:xfrm>
-          <a:prstGeom prst="straightConnector1">
-            <a:avLst/>
-          </a:prstGeom>
-          <a:ln>
-            <a:tailEnd type="arrow" w="lg" len="lg"/>
-          </a:ln>
-        </p:spPr>
-        <p:style>
-          <a:lnRef idx="2">
-            <a:schemeClr val="dk1"/>
-          </a:lnRef>
-          <a:fillRef idx="0">
-            <a:schemeClr val="dk1"/>
-          </a:fillRef>
-          <a:effectRef idx="1">
-            <a:schemeClr val="dk1"/>
-          </a:effectRef>
-          <a:fontRef idx="minor">
-            <a:schemeClr val="tx1"/>
-          </a:fontRef>
-        </p:style>
-      </p:cxnSp>
-      <p:cxnSp>
-        <p:nvCxnSpPr>
-          <p:cNvPr id="23" name="Straight Arrow Connector 22"/>
-          <p:cNvCxnSpPr/>
-          <p:nvPr/>
-        </p:nvCxnSpPr>
-        <p:spPr>
-          <a:xfrm flipV="1">
-            <a:off x="2085370" y="2728610"/>
-            <a:ext cx="3134702" cy="830556"/>
-          </a:xfrm>
-          <a:prstGeom prst="straightConnector1">
-            <a:avLst/>
-          </a:prstGeom>
-          <a:ln>
-            <a:tailEnd type="oval" w="lg" len="lg"/>
-          </a:ln>
-        </p:spPr>
-        <p:style>
-          <a:lnRef idx="2">
-            <a:schemeClr val="dk1"/>
-          </a:lnRef>
-          <a:fillRef idx="0">
-            <a:schemeClr val="dk1"/>
-          </a:fillRef>
-          <a:effectRef idx="1">
-            <a:schemeClr val="dk1"/>
-          </a:effectRef>
-          <a:fontRef idx="minor">
-            <a:schemeClr val="tx1"/>
-          </a:fontRef>
-        </p:style>
-      </p:cxnSp>
-      <p:sp>
-        <p:nvSpPr>
-          <p:cNvPr id="19" name="Oval 18"/>
-          <p:cNvSpPr/>
-          <p:nvPr/>
-        </p:nvSpPr>
-        <p:spPr>
-          <a:xfrm>
-            <a:off x="1992345" y="3489133"/>
-            <a:ext cx="144016" cy="144016"/>
-          </a:xfrm>
-          <a:prstGeom prst="ellipse">
-            <a:avLst/>
-          </a:prstGeom>
-        </p:spPr>
-        <p:style>
-          <a:lnRef idx="1">
-            <a:schemeClr val="dk1"/>
-          </a:lnRef>
-          <a:fillRef idx="2">
-            <a:schemeClr val="dk1"/>
-          </a:fillRef>
-          <a:effectRef idx="1">
-            <a:schemeClr val="dk1"/>
-          </a:effectRef>
-          <a:fontRef idx="minor">
-            <a:schemeClr val="dk1"/>
-          </a:fontRef>
-        </p:style>
-        <p:txBody>
-          <a:bodyPr rtlCol="0" anchor="ctr"/>
-          <a:lstStyle/>
-          <a:p>
-            <a:pPr algn="ctr"/>
-            <a:endParaRPr lang="ko-KR" altLang="en-US"/>
-          </a:p>
-        </p:txBody>
-      </p:sp>
-      <p:sp>
-        <p:nvSpPr>
-          <p:cNvPr id="15" name="Parallelogram 14"/>
-          <p:cNvSpPr/>
-          <p:nvPr/>
-        </p:nvSpPr>
-        <p:spPr>
-          <a:xfrm rot="16200000" flipH="1">
-            <a:off x="3186100" y="2703676"/>
-            <a:ext cx="3203848" cy="1728192"/>
-          </a:xfrm>
-          <a:prstGeom prst="parallelogram">
-            <a:avLst>
-              <a:gd name="adj" fmla="val 78473"/>
-            </a:avLst>
-          </a:prstGeom>
-        </p:spPr>
-        <p:style>
-          <a:lnRef idx="2">
-            <a:schemeClr val="dk1"/>
-          </a:lnRef>
-          <a:fillRef idx="1">
-            <a:schemeClr val="lt1"/>
-          </a:fillRef>
-          <a:effectRef idx="0">
-            <a:schemeClr val="dk1"/>
-          </a:effectRef>
-          <a:fontRef idx="minor">
-            <a:schemeClr val="dk1"/>
-          </a:fontRef>
-        </p:style>
-        <p:txBody>
-          <a:bodyPr rtlCol="0" anchor="ctr"/>
-          <a:lstStyle/>
-          <a:p>
-            <a:pPr algn="ctr"/>
-            <a:endParaRPr lang="ko-KR" altLang="en-US"/>
-          </a:p>
-        </p:txBody>
-      </p:sp>
-      <p:cxnSp>
-        <p:nvCxnSpPr>
-          <p:cNvPr id="17" name="Straight Arrow Connector 16"/>
-          <p:cNvCxnSpPr/>
-          <p:nvPr/>
-        </p:nvCxnSpPr>
-        <p:spPr>
-          <a:xfrm>
-            <a:off x="4773881" y="3562342"/>
-            <a:ext cx="3468552" cy="1588"/>
-          </a:xfrm>
-          <a:prstGeom prst="straightConnector1">
-            <a:avLst/>
-          </a:prstGeom>
-          <a:ln>
-            <a:tailEnd type="arrow" w="lg" len="lg"/>
-          </a:ln>
-        </p:spPr>
-        <p:style>
-          <a:lnRef idx="2">
-            <a:schemeClr val="dk1"/>
-          </a:lnRef>
-          <a:fillRef idx="0">
-            <a:schemeClr val="dk1"/>
-          </a:fillRef>
-          <a:effectRef idx="1">
-            <a:schemeClr val="dk1"/>
-          </a:effectRef>
-          <a:fontRef idx="minor">
-            <a:schemeClr val="tx1"/>
-          </a:fontRef>
-        </p:style>
-      </p:cxnSp>
-      <p:sp>
-        <p:nvSpPr>
-          <p:cNvPr id="22" name="Oval 21"/>
-          <p:cNvSpPr/>
-          <p:nvPr/>
-        </p:nvSpPr>
-        <p:spPr>
-          <a:xfrm>
-            <a:off x="4703383" y="3489133"/>
-            <a:ext cx="144016" cy="144016"/>
-          </a:xfrm>
-          <a:prstGeom prst="ellipse">
-            <a:avLst/>
-          </a:prstGeom>
-        </p:spPr>
-        <p:style>
-          <a:lnRef idx="1">
-            <a:schemeClr val="dk1"/>
-          </a:lnRef>
-          <a:fillRef idx="2">
-            <a:schemeClr val="dk1"/>
-          </a:fillRef>
-          <a:effectRef idx="1">
-            <a:schemeClr val="dk1"/>
-          </a:effectRef>
-          <a:fontRef idx="minor">
-            <a:schemeClr val="dk1"/>
-          </a:fontRef>
-        </p:style>
-        <p:txBody>
-          <a:bodyPr rtlCol="0" anchor="ctr"/>
-          <a:lstStyle/>
-          <a:p>
-            <a:pPr algn="ctr"/>
-            <a:endParaRPr lang="ko-KR" altLang="en-US"/>
-          </a:p>
-        </p:txBody>
-      </p:sp>
-      <p:cxnSp>
-        <p:nvCxnSpPr>
-          <p:cNvPr id="25" name="Straight Arrow Connector 24"/>
-          <p:cNvCxnSpPr/>
-          <p:nvPr/>
-        </p:nvCxnSpPr>
-        <p:spPr>
-          <a:xfrm flipV="1">
-            <a:off x="5148064" y="2070748"/>
-            <a:ext cx="2602188" cy="689464"/>
-          </a:xfrm>
-          <a:prstGeom prst="straightConnector1">
-            <a:avLst/>
-          </a:prstGeom>
-          <a:ln>
-            <a:tailEnd type="oval" w="lg" len="lg"/>
-          </a:ln>
-        </p:spPr>
-        <p:style>
-          <a:lnRef idx="2">
-            <a:schemeClr val="dk1"/>
-          </a:lnRef>
-          <a:fillRef idx="0">
-            <a:schemeClr val="dk1"/>
-          </a:fillRef>
-          <a:effectRef idx="1">
-            <a:schemeClr val="dk1"/>
-          </a:effectRef>
-          <a:fontRef idx="minor">
-            <a:schemeClr val="tx1"/>
-          </a:fontRef>
-        </p:style>
-      </p:cxnSp>
-      <p:sp>
-        <p:nvSpPr>
-          <p:cNvPr id="28" name="Oval 27"/>
-          <p:cNvSpPr/>
-          <p:nvPr/>
-        </p:nvSpPr>
-        <p:spPr>
-          <a:xfrm>
-            <a:off x="5051548" y="2685170"/>
-            <a:ext cx="144016" cy="144016"/>
-          </a:xfrm>
-          <a:prstGeom prst="ellipse">
-            <a:avLst/>
-          </a:prstGeom>
-        </p:spPr>
-        <p:style>
-          <a:lnRef idx="1">
-            <a:schemeClr val="dk1"/>
-          </a:lnRef>
-          <a:fillRef idx="2">
-            <a:schemeClr val="dk1"/>
-          </a:fillRef>
-          <a:effectRef idx="1">
-            <a:schemeClr val="dk1"/>
-          </a:effectRef>
-          <a:fontRef idx="minor">
-            <a:schemeClr val="dk1"/>
-          </a:fontRef>
-        </p:style>
-        <p:txBody>
-          <a:bodyPr rtlCol="0" anchor="ctr"/>
-          <a:lstStyle/>
-          <a:p>
-            <a:pPr algn="ctr"/>
-            <a:endParaRPr lang="ko-KR" altLang="en-US"/>
-          </a:p>
-        </p:txBody>
-      </p:sp>
+        </p:grpSpPr>
+        <p:cxnSp>
+          <p:nvCxnSpPr>
+            <p:cNvPr id="7" name="Straight Arrow Connector 6"/>
+            <p:cNvCxnSpPr/>
+            <p:nvPr/>
+          </p:nvCxnSpPr>
+          <p:spPr>
+            <a:xfrm flipV="1">
+              <a:off x="275270" y="2144731"/>
+              <a:ext cx="3600400" cy="2808312"/>
+            </a:xfrm>
+            <a:prstGeom prst="straightConnector1">
+              <a:avLst/>
+            </a:prstGeom>
+            <a:ln>
+              <a:tailEnd type="arrow" w="lg" len="lg"/>
+            </a:ln>
+          </p:spPr>
+          <p:style>
+            <a:lnRef idx="2">
+              <a:schemeClr val="dk1"/>
+            </a:lnRef>
+            <a:fillRef idx="0">
+              <a:schemeClr val="dk1"/>
+            </a:fillRef>
+            <a:effectRef idx="1">
+              <a:schemeClr val="dk1"/>
+            </a:effectRef>
+            <a:fontRef idx="minor">
+              <a:schemeClr val="tx1"/>
+            </a:fontRef>
+          </p:style>
+        </p:cxnSp>
+        <p:cxnSp>
+          <p:nvCxnSpPr>
+            <p:cNvPr id="8" name="Straight Arrow Connector 7"/>
+            <p:cNvCxnSpPr/>
+            <p:nvPr/>
+          </p:nvCxnSpPr>
+          <p:spPr>
+            <a:xfrm rot="5400000" flipH="1" flipV="1">
+              <a:off x="900386" y="2407461"/>
+              <a:ext cx="2304256" cy="1588"/>
+            </a:xfrm>
+            <a:prstGeom prst="straightConnector1">
+              <a:avLst/>
+            </a:prstGeom>
+            <a:ln>
+              <a:tailEnd type="arrow" w="lg" len="lg"/>
+            </a:ln>
+          </p:spPr>
+          <p:style>
+            <a:lnRef idx="2">
+              <a:schemeClr val="dk1"/>
+            </a:lnRef>
+            <a:fillRef idx="0">
+              <a:schemeClr val="dk1"/>
+            </a:fillRef>
+            <a:effectRef idx="1">
+              <a:schemeClr val="dk1"/>
+            </a:effectRef>
+            <a:fontRef idx="minor">
+              <a:schemeClr val="tx1"/>
+            </a:fontRef>
+          </p:style>
+        </p:cxnSp>
+        <p:cxnSp>
+          <p:nvCxnSpPr>
+            <p:cNvPr id="10" name="Straight Arrow Connector 9"/>
+            <p:cNvCxnSpPr/>
+            <p:nvPr/>
+          </p:nvCxnSpPr>
+          <p:spPr>
+            <a:xfrm>
+              <a:off x="2063595" y="3561141"/>
+              <a:ext cx="2796437" cy="1588"/>
+            </a:xfrm>
+            <a:prstGeom prst="straightConnector1">
+              <a:avLst/>
+            </a:prstGeom>
+            <a:ln>
+              <a:tailEnd type="arrow" w="lg" len="lg"/>
+            </a:ln>
+          </p:spPr>
+          <p:style>
+            <a:lnRef idx="2">
+              <a:schemeClr val="dk1"/>
+            </a:lnRef>
+            <a:fillRef idx="0">
+              <a:schemeClr val="dk1"/>
+            </a:fillRef>
+            <a:effectRef idx="1">
+              <a:schemeClr val="dk1"/>
+            </a:effectRef>
+            <a:fontRef idx="minor">
+              <a:schemeClr val="tx1"/>
+            </a:fontRef>
+          </p:style>
+        </p:cxnSp>
+        <p:cxnSp>
+          <p:nvCxnSpPr>
+            <p:cNvPr id="23" name="Straight Arrow Connector 22"/>
+            <p:cNvCxnSpPr/>
+            <p:nvPr/>
+          </p:nvCxnSpPr>
+          <p:spPr>
+            <a:xfrm flipV="1">
+              <a:off x="2085370" y="2728610"/>
+              <a:ext cx="3134702" cy="830556"/>
+            </a:xfrm>
+            <a:prstGeom prst="straightConnector1">
+              <a:avLst/>
+            </a:prstGeom>
+            <a:ln>
+              <a:tailEnd type="oval" w="lg" len="lg"/>
+            </a:ln>
+          </p:spPr>
+          <p:style>
+            <a:lnRef idx="2">
+              <a:schemeClr val="dk1"/>
+            </a:lnRef>
+            <a:fillRef idx="0">
+              <a:schemeClr val="dk1"/>
+            </a:fillRef>
+            <a:effectRef idx="1">
+              <a:schemeClr val="dk1"/>
+            </a:effectRef>
+            <a:fontRef idx="minor">
+              <a:schemeClr val="tx1"/>
+            </a:fontRef>
+          </p:style>
+        </p:cxnSp>
+        <p:sp>
+          <p:nvSpPr>
+            <p:cNvPr id="19" name="Oval 18"/>
+            <p:cNvSpPr/>
+            <p:nvPr/>
+          </p:nvSpPr>
+          <p:spPr>
+            <a:xfrm>
+              <a:off x="1992345" y="3489133"/>
+              <a:ext cx="144016" cy="144016"/>
+            </a:xfrm>
+            <a:prstGeom prst="ellipse">
+              <a:avLst/>
+            </a:prstGeom>
+          </p:spPr>
+          <p:style>
+            <a:lnRef idx="1">
+              <a:schemeClr val="dk1"/>
+            </a:lnRef>
+            <a:fillRef idx="2">
+              <a:schemeClr val="dk1"/>
+            </a:fillRef>
+            <a:effectRef idx="1">
+              <a:schemeClr val="dk1"/>
+            </a:effectRef>
+            <a:fontRef idx="minor">
+              <a:schemeClr val="dk1"/>
+            </a:fontRef>
+          </p:style>
+          <p:txBody>
+            <a:bodyPr rtlCol="0" anchor="ctr"/>
+            <a:lstStyle/>
+            <a:p>
+              <a:pPr algn="ctr"/>
+              <a:endParaRPr lang="ko-KR" altLang="en-US"/>
+            </a:p>
+          </p:txBody>
+        </p:sp>
+        <p:sp>
+          <p:nvSpPr>
+            <p:cNvPr id="15" name="Parallelogram 14"/>
+            <p:cNvSpPr/>
+            <p:nvPr/>
+          </p:nvSpPr>
+          <p:spPr>
+            <a:xfrm rot="16200000" flipH="1">
+              <a:off x="3186100" y="2703676"/>
+              <a:ext cx="3203848" cy="1728192"/>
+            </a:xfrm>
+            <a:prstGeom prst="parallelogram">
+              <a:avLst>
+                <a:gd name="adj" fmla="val 78473"/>
+              </a:avLst>
+            </a:prstGeom>
+          </p:spPr>
+          <p:style>
+            <a:lnRef idx="2">
+              <a:schemeClr val="dk1"/>
+            </a:lnRef>
+            <a:fillRef idx="1">
+              <a:schemeClr val="lt1"/>
+            </a:fillRef>
+            <a:effectRef idx="0">
+              <a:schemeClr val="dk1"/>
+            </a:effectRef>
+            <a:fontRef idx="minor">
+              <a:schemeClr val="dk1"/>
+            </a:fontRef>
+          </p:style>
+          <p:txBody>
+            <a:bodyPr rtlCol="0" anchor="ctr"/>
+            <a:lstStyle/>
+            <a:p>
+              <a:pPr algn="ctr"/>
+              <a:endParaRPr lang="ko-KR" altLang="en-US"/>
+            </a:p>
+          </p:txBody>
+        </p:sp>
+        <p:cxnSp>
+          <p:nvCxnSpPr>
+            <p:cNvPr id="17" name="Straight Arrow Connector 16"/>
+            <p:cNvCxnSpPr/>
+            <p:nvPr/>
+          </p:nvCxnSpPr>
+          <p:spPr>
+            <a:xfrm>
+              <a:off x="4773881" y="3562342"/>
+              <a:ext cx="3468552" cy="1588"/>
+            </a:xfrm>
+            <a:prstGeom prst="straightConnector1">
+              <a:avLst/>
+            </a:prstGeom>
+            <a:ln>
+              <a:tailEnd type="arrow" w="lg" len="lg"/>
+            </a:ln>
+          </p:spPr>
+          <p:style>
+            <a:lnRef idx="2">
+              <a:schemeClr val="dk1"/>
+            </a:lnRef>
+            <a:fillRef idx="0">
+              <a:schemeClr val="dk1"/>
+            </a:fillRef>
+            <a:effectRef idx="1">
+              <a:schemeClr val="dk1"/>
+            </a:effectRef>
+            <a:fontRef idx="minor">
+              <a:schemeClr val="tx1"/>
+            </a:fontRef>
+          </p:style>
+        </p:cxnSp>
+        <p:sp>
+          <p:nvSpPr>
+            <p:cNvPr id="22" name="Oval 21"/>
+            <p:cNvSpPr/>
+            <p:nvPr/>
+          </p:nvSpPr>
+          <p:spPr>
+            <a:xfrm>
+              <a:off x="4703383" y="3489133"/>
+              <a:ext cx="144016" cy="144016"/>
+            </a:xfrm>
+            <a:prstGeom prst="ellipse">
+              <a:avLst/>
+            </a:prstGeom>
+          </p:spPr>
+          <p:style>
+            <a:lnRef idx="1">
+              <a:schemeClr val="dk1"/>
+            </a:lnRef>
+            <a:fillRef idx="2">
+              <a:schemeClr val="dk1"/>
+            </a:fillRef>
+            <a:effectRef idx="1">
+              <a:schemeClr val="dk1"/>
+            </a:effectRef>
+            <a:fontRef idx="minor">
+              <a:schemeClr val="dk1"/>
+            </a:fontRef>
+          </p:style>
+          <p:txBody>
+            <a:bodyPr rtlCol="0" anchor="ctr"/>
+            <a:lstStyle/>
+            <a:p>
+              <a:pPr algn="ctr"/>
+              <a:endParaRPr lang="ko-KR" altLang="en-US"/>
+            </a:p>
+          </p:txBody>
+        </p:sp>
+        <p:cxnSp>
+          <p:nvCxnSpPr>
+            <p:cNvPr id="25" name="Straight Arrow Connector 24"/>
+            <p:cNvCxnSpPr/>
+            <p:nvPr/>
+          </p:nvCxnSpPr>
+          <p:spPr>
+            <a:xfrm flipV="1">
+              <a:off x="5148064" y="2070748"/>
+              <a:ext cx="2602188" cy="689464"/>
+            </a:xfrm>
+            <a:prstGeom prst="straightConnector1">
+              <a:avLst/>
+            </a:prstGeom>
+            <a:ln>
+              <a:tailEnd type="oval" w="lg" len="lg"/>
+            </a:ln>
+          </p:spPr>
+          <p:style>
+            <a:lnRef idx="2">
+              <a:schemeClr val="dk1"/>
+            </a:lnRef>
+            <a:fillRef idx="0">
+              <a:schemeClr val="dk1"/>
+            </a:fillRef>
+            <a:effectRef idx="1">
+              <a:schemeClr val="dk1"/>
+            </a:effectRef>
+            <a:fontRef idx="minor">
+              <a:schemeClr val="tx1"/>
+            </a:fontRef>
+          </p:style>
+        </p:cxnSp>
+        <p:sp>
+          <p:nvSpPr>
+            <p:cNvPr id="28" name="Oval 27"/>
+            <p:cNvSpPr/>
+            <p:nvPr/>
+          </p:nvSpPr>
+          <p:spPr>
+            <a:xfrm>
+              <a:off x="5051548" y="2685170"/>
+              <a:ext cx="144016" cy="144016"/>
+            </a:xfrm>
+            <a:prstGeom prst="ellipse">
+              <a:avLst/>
+            </a:prstGeom>
+          </p:spPr>
+          <p:style>
+            <a:lnRef idx="1">
+              <a:schemeClr val="dk1"/>
+            </a:lnRef>
+            <a:fillRef idx="2">
+              <a:schemeClr val="dk1"/>
+            </a:fillRef>
+            <a:effectRef idx="1">
+              <a:schemeClr val="dk1"/>
+            </a:effectRef>
+            <a:fontRef idx="minor">
+              <a:schemeClr val="dk1"/>
+            </a:fontRef>
+          </p:style>
+          <p:txBody>
+            <a:bodyPr rtlCol="0" anchor="ctr"/>
+            <a:lstStyle/>
+            <a:p>
+              <a:pPr algn="ctr"/>
+              <a:endParaRPr lang="ko-KR" altLang="en-US"/>
+            </a:p>
+          </p:txBody>
+        </p:sp>
+      </p:grpSp>
       <p:sp>
         <p:nvSpPr>
           <p:cNvPr id="29" name="TextBox 28"/>
@@ -5248,6 +5263,790 @@
           <a:chExt cx="0" cy="0"/>
         </a:xfrm>
       </p:grpSpPr>
+      <p:cxnSp>
+        <p:nvCxnSpPr>
+          <p:cNvPr id="18" name="Straight Arrow Connector 17"/>
+          <p:cNvCxnSpPr/>
+          <p:nvPr/>
+        </p:nvCxnSpPr>
+        <p:spPr>
+          <a:xfrm rot="10800000" flipV="1">
+            <a:off x="4593036" y="4572128"/>
+            <a:ext cx="1765581" cy="1377152"/>
+          </a:xfrm>
+          <a:prstGeom prst="straightConnector1">
+            <a:avLst/>
+          </a:prstGeom>
+          <a:ln>
+            <a:tailEnd type="arrow" w="lg" len="lg"/>
+          </a:ln>
+        </p:spPr>
+        <p:style>
+          <a:lnRef idx="2">
+            <a:schemeClr val="dk1"/>
+          </a:lnRef>
+          <a:fillRef idx="0">
+            <a:schemeClr val="dk1"/>
+          </a:fillRef>
+          <a:effectRef idx="1">
+            <a:schemeClr val="dk1"/>
+          </a:effectRef>
+          <a:fontRef idx="minor">
+            <a:schemeClr val="tx1"/>
+          </a:fontRef>
+        </p:style>
+      </p:cxnSp>
+      <p:grpSp>
+        <p:nvGrpSpPr>
+          <p:cNvPr id="27" name="Group 26"/>
+          <p:cNvGrpSpPr/>
+          <p:nvPr/>
+        </p:nvGrpSpPr>
+        <p:grpSpPr>
+          <a:xfrm>
+            <a:off x="782358" y="-421118"/>
+            <a:ext cx="3689305" cy="5886909"/>
+            <a:chOff x="1091108" y="-361743"/>
+            <a:chExt cx="3689305" cy="5886909"/>
+          </a:xfrm>
+        </p:grpSpPr>
+        <p:grpSp>
+          <p:nvGrpSpPr>
+            <p:cNvPr id="2" name="Group 1"/>
+            <p:cNvGrpSpPr/>
+            <p:nvPr/>
+          </p:nvGrpSpPr>
+          <p:grpSpPr>
+            <a:xfrm rot="2700000">
+              <a:off x="487576" y="1232330"/>
+              <a:ext cx="5886909" cy="2698764"/>
+              <a:chOff x="275270" y="1115140"/>
+              <a:chExt cx="8844347" cy="4054556"/>
+            </a:xfrm>
+          </p:grpSpPr>
+          <p:cxnSp>
+            <p:nvCxnSpPr>
+              <p:cNvPr id="3" name="Straight Arrow Connector 2"/>
+              <p:cNvCxnSpPr/>
+              <p:nvPr/>
+            </p:nvCxnSpPr>
+            <p:spPr>
+              <a:xfrm flipV="1">
+                <a:off x="275270" y="2144731"/>
+                <a:ext cx="3600400" cy="2808312"/>
+              </a:xfrm>
+              <a:prstGeom prst="straightConnector1">
+                <a:avLst/>
+              </a:prstGeom>
+              <a:ln>
+                <a:tailEnd type="arrow" w="lg" len="lg"/>
+              </a:ln>
+            </p:spPr>
+            <p:style>
+              <a:lnRef idx="2">
+                <a:schemeClr val="dk1"/>
+              </a:lnRef>
+              <a:fillRef idx="0">
+                <a:schemeClr val="dk1"/>
+              </a:fillRef>
+              <a:effectRef idx="1">
+                <a:schemeClr val="dk1"/>
+              </a:effectRef>
+              <a:fontRef idx="minor">
+                <a:schemeClr val="tx1"/>
+              </a:fontRef>
+            </p:style>
+          </p:cxnSp>
+          <p:cxnSp>
+            <p:nvCxnSpPr>
+              <p:cNvPr id="4" name="Straight Arrow Connector 3"/>
+              <p:cNvCxnSpPr/>
+              <p:nvPr/>
+            </p:nvCxnSpPr>
+            <p:spPr>
+              <a:xfrm rot="5400000" flipH="1" flipV="1">
+                <a:off x="900386" y="2407461"/>
+                <a:ext cx="2304256" cy="1588"/>
+              </a:xfrm>
+              <a:prstGeom prst="straightConnector1">
+                <a:avLst/>
+              </a:prstGeom>
+              <a:ln>
+                <a:tailEnd type="arrow" w="lg" len="lg"/>
+              </a:ln>
+            </p:spPr>
+            <p:style>
+              <a:lnRef idx="2">
+                <a:schemeClr val="dk1"/>
+              </a:lnRef>
+              <a:fillRef idx="0">
+                <a:schemeClr val="dk1"/>
+              </a:fillRef>
+              <a:effectRef idx="1">
+                <a:schemeClr val="dk1"/>
+              </a:effectRef>
+              <a:fontRef idx="minor">
+                <a:schemeClr val="tx1"/>
+              </a:fontRef>
+            </p:style>
+          </p:cxnSp>
+          <p:cxnSp>
+            <p:nvCxnSpPr>
+              <p:cNvPr id="5" name="Straight Arrow Connector 4"/>
+              <p:cNvCxnSpPr/>
+              <p:nvPr/>
+            </p:nvCxnSpPr>
+            <p:spPr>
+              <a:xfrm>
+                <a:off x="2063595" y="3561141"/>
+                <a:ext cx="2796437" cy="1588"/>
+              </a:xfrm>
+              <a:prstGeom prst="straightConnector1">
+                <a:avLst/>
+              </a:prstGeom>
+              <a:ln>
+                <a:tailEnd type="arrow" w="lg" len="lg"/>
+              </a:ln>
+            </p:spPr>
+            <p:style>
+              <a:lnRef idx="2">
+                <a:schemeClr val="dk1"/>
+              </a:lnRef>
+              <a:fillRef idx="0">
+                <a:schemeClr val="dk1"/>
+              </a:fillRef>
+              <a:effectRef idx="1">
+                <a:schemeClr val="dk1"/>
+              </a:effectRef>
+              <a:fontRef idx="minor">
+                <a:schemeClr val="tx1"/>
+              </a:fontRef>
+            </p:style>
+          </p:cxnSp>
+          <p:cxnSp>
+            <p:nvCxnSpPr>
+              <p:cNvPr id="6" name="Straight Arrow Connector 5"/>
+              <p:cNvCxnSpPr/>
+              <p:nvPr/>
+            </p:nvCxnSpPr>
+            <p:spPr>
+              <a:xfrm flipV="1">
+                <a:off x="2085370" y="2728610"/>
+                <a:ext cx="3134702" cy="830556"/>
+              </a:xfrm>
+              <a:prstGeom prst="straightConnector1">
+                <a:avLst/>
+              </a:prstGeom>
+              <a:ln>
+                <a:prstDash val="sysDash"/>
+                <a:tailEnd type="oval" w="lg" len="lg"/>
+              </a:ln>
+            </p:spPr>
+            <p:style>
+              <a:lnRef idx="2">
+                <a:schemeClr val="dk1"/>
+              </a:lnRef>
+              <a:fillRef idx="0">
+                <a:schemeClr val="dk1"/>
+              </a:fillRef>
+              <a:effectRef idx="1">
+                <a:schemeClr val="dk1"/>
+              </a:effectRef>
+              <a:fontRef idx="minor">
+                <a:schemeClr val="tx1"/>
+              </a:fontRef>
+            </p:style>
+          </p:cxnSp>
+          <p:sp>
+            <p:nvSpPr>
+              <p:cNvPr id="7" name="Oval 6"/>
+              <p:cNvSpPr/>
+              <p:nvPr/>
+            </p:nvSpPr>
+            <p:spPr>
+              <a:xfrm>
+                <a:off x="1992345" y="3489133"/>
+                <a:ext cx="144016" cy="144016"/>
+              </a:xfrm>
+              <a:prstGeom prst="ellipse">
+                <a:avLst/>
+              </a:prstGeom>
+            </p:spPr>
+            <p:style>
+              <a:lnRef idx="1">
+                <a:schemeClr val="dk1"/>
+              </a:lnRef>
+              <a:fillRef idx="2">
+                <a:schemeClr val="dk1"/>
+              </a:fillRef>
+              <a:effectRef idx="1">
+                <a:schemeClr val="dk1"/>
+              </a:effectRef>
+              <a:fontRef idx="minor">
+                <a:schemeClr val="dk1"/>
+              </a:fontRef>
+            </p:style>
+            <p:txBody>
+              <a:bodyPr rtlCol="0" anchor="ctr"/>
+              <a:lstStyle/>
+              <a:p>
+                <a:pPr algn="ctr"/>
+                <a:endParaRPr lang="ko-KR" altLang="en-US"/>
+              </a:p>
+            </p:txBody>
+          </p:sp>
+          <p:sp>
+            <p:nvSpPr>
+              <p:cNvPr id="8" name="Parallelogram 7"/>
+              <p:cNvSpPr/>
+              <p:nvPr/>
+            </p:nvSpPr>
+            <p:spPr>
+              <a:xfrm rot="16200000" flipH="1">
+                <a:off x="3186100" y="2703676"/>
+                <a:ext cx="3203848" cy="1728192"/>
+              </a:xfrm>
+              <a:prstGeom prst="parallelogram">
+                <a:avLst>
+                  <a:gd name="adj" fmla="val 78473"/>
+                </a:avLst>
+              </a:prstGeom>
+            </p:spPr>
+            <p:style>
+              <a:lnRef idx="2">
+                <a:schemeClr val="dk1"/>
+              </a:lnRef>
+              <a:fillRef idx="1">
+                <a:schemeClr val="lt1"/>
+              </a:fillRef>
+              <a:effectRef idx="0">
+                <a:schemeClr val="dk1"/>
+              </a:effectRef>
+              <a:fontRef idx="minor">
+                <a:schemeClr val="dk1"/>
+              </a:fontRef>
+            </p:style>
+            <p:txBody>
+              <a:bodyPr rtlCol="0" anchor="ctr"/>
+              <a:lstStyle/>
+              <a:p>
+                <a:pPr algn="ctr"/>
+                <a:endParaRPr lang="ko-KR" altLang="en-US"/>
+              </a:p>
+            </p:txBody>
+          </p:sp>
+          <p:cxnSp>
+            <p:nvCxnSpPr>
+              <p:cNvPr id="9" name="Straight Arrow Connector 8"/>
+              <p:cNvCxnSpPr/>
+              <p:nvPr/>
+            </p:nvCxnSpPr>
+            <p:spPr>
+              <a:xfrm rot="13500000" flipH="1">
+                <a:off x="5118080" y="2731370"/>
+                <a:ext cx="1661944" cy="1661944"/>
+              </a:xfrm>
+              <a:prstGeom prst="straightConnector1">
+                <a:avLst/>
+              </a:prstGeom>
+              <a:ln>
+                <a:tailEnd type="arrow" w="lg" len="lg"/>
+              </a:ln>
+            </p:spPr>
+            <p:style>
+              <a:lnRef idx="2">
+                <a:schemeClr val="dk1"/>
+              </a:lnRef>
+              <a:fillRef idx="0">
+                <a:schemeClr val="dk1"/>
+              </a:fillRef>
+              <a:effectRef idx="1">
+                <a:schemeClr val="dk1"/>
+              </a:effectRef>
+              <a:fontRef idx="minor">
+                <a:schemeClr val="tx1"/>
+              </a:fontRef>
+            </p:style>
+          </p:cxnSp>
+          <p:sp>
+            <p:nvSpPr>
+              <p:cNvPr id="10" name="Oval 9"/>
+              <p:cNvSpPr/>
+              <p:nvPr/>
+            </p:nvSpPr>
+            <p:spPr>
+              <a:xfrm>
+                <a:off x="4703383" y="3489133"/>
+                <a:ext cx="144016" cy="144016"/>
+              </a:xfrm>
+              <a:prstGeom prst="ellipse">
+                <a:avLst/>
+              </a:prstGeom>
+            </p:spPr>
+            <p:style>
+              <a:lnRef idx="1">
+                <a:schemeClr val="dk1"/>
+              </a:lnRef>
+              <a:fillRef idx="2">
+                <a:schemeClr val="dk1"/>
+              </a:fillRef>
+              <a:effectRef idx="1">
+                <a:schemeClr val="dk1"/>
+              </a:effectRef>
+              <a:fontRef idx="minor">
+                <a:schemeClr val="dk1"/>
+              </a:fontRef>
+            </p:style>
+            <p:txBody>
+              <a:bodyPr rtlCol="0" anchor="ctr"/>
+              <a:lstStyle/>
+              <a:p>
+                <a:pPr algn="ctr"/>
+                <a:endParaRPr lang="ko-KR" altLang="en-US"/>
+              </a:p>
+            </p:txBody>
+          </p:sp>
+          <p:cxnSp>
+            <p:nvCxnSpPr>
+              <p:cNvPr id="11" name="Straight Arrow Connector 10"/>
+              <p:cNvCxnSpPr/>
+              <p:nvPr/>
+            </p:nvCxnSpPr>
+            <p:spPr>
+              <a:xfrm rot="18900000">
+                <a:off x="5369322" y="1115140"/>
+                <a:ext cx="3750295" cy="2179236"/>
+              </a:xfrm>
+              <a:prstGeom prst="straightConnector1">
+                <a:avLst/>
+              </a:prstGeom>
+              <a:ln>
+                <a:prstDash val="sysDash"/>
+                <a:tailEnd type="oval" w="lg" len="lg"/>
+              </a:ln>
+            </p:spPr>
+            <p:style>
+              <a:lnRef idx="2">
+                <a:schemeClr val="dk1"/>
+              </a:lnRef>
+              <a:fillRef idx="0">
+                <a:schemeClr val="dk1"/>
+              </a:fillRef>
+              <a:effectRef idx="1">
+                <a:schemeClr val="dk1"/>
+              </a:effectRef>
+              <a:fontRef idx="minor">
+                <a:schemeClr val="tx1"/>
+              </a:fontRef>
+            </p:style>
+          </p:cxnSp>
+          <p:sp>
+            <p:nvSpPr>
+              <p:cNvPr id="12" name="Oval 11"/>
+              <p:cNvSpPr/>
+              <p:nvPr/>
+            </p:nvSpPr>
+            <p:spPr>
+              <a:xfrm>
+                <a:off x="5051548" y="2685170"/>
+                <a:ext cx="144016" cy="144016"/>
+              </a:xfrm>
+              <a:prstGeom prst="ellipse">
+                <a:avLst/>
+              </a:prstGeom>
+            </p:spPr>
+            <p:style>
+              <a:lnRef idx="1">
+                <a:schemeClr val="dk1"/>
+              </a:lnRef>
+              <a:fillRef idx="2">
+                <a:schemeClr val="dk1"/>
+              </a:fillRef>
+              <a:effectRef idx="1">
+                <a:schemeClr val="dk1"/>
+              </a:effectRef>
+              <a:fontRef idx="minor">
+                <a:schemeClr val="dk1"/>
+              </a:fontRef>
+            </p:style>
+            <p:txBody>
+              <a:bodyPr rtlCol="0" anchor="ctr"/>
+              <a:lstStyle/>
+              <a:p>
+                <a:pPr algn="ctr"/>
+                <a:endParaRPr lang="ko-KR" altLang="en-US"/>
+              </a:p>
+            </p:txBody>
+          </p:sp>
+        </p:grpSp>
+        <p:sp>
+          <p:nvSpPr>
+            <p:cNvPr id="13" name="TextBox 12"/>
+            <p:cNvSpPr txBox="1"/>
+            <p:nvPr/>
+          </p:nvSpPr>
+          <p:spPr>
+            <a:xfrm>
+              <a:off x="1091108" y="1020939"/>
+              <a:ext cx="1296144" cy="523220"/>
+            </a:xfrm>
+            <a:prstGeom prst="rect">
+              <a:avLst/>
+            </a:prstGeom>
+            <a:noFill/>
+          </p:spPr>
+          <p:txBody>
+            <a:bodyPr wrap="square" rtlCol="0">
+              <a:spAutoFit/>
+            </a:bodyPr>
+            <a:lstStyle/>
+            <a:p>
+              <a:pPr algn="ctr"/>
+              <a:r>
+                <a:rPr lang="en-US" altLang="ko-KR" sz="1400" dirty="0" smtClean="0">
+                  <a:latin typeface="Georgia" pitchFamily="18" charset="0"/>
+                </a:rPr>
+                <a:t>Camera</a:t>
+              </a:r>
+            </a:p>
+            <a:p>
+              <a:pPr algn="ctr"/>
+              <a:r>
+                <a:rPr lang="en-US" altLang="ko-KR" sz="1400" dirty="0" smtClean="0">
+                  <a:latin typeface="Georgia" pitchFamily="18" charset="0"/>
+                </a:rPr>
+                <a:t>center</a:t>
+              </a:r>
+              <a:endParaRPr lang="ko-KR" altLang="en-US" sz="1400" dirty="0">
+                <a:latin typeface="Georgia" pitchFamily="18" charset="0"/>
+              </a:endParaRPr>
+            </a:p>
+          </p:txBody>
+        </p:sp>
+        <p:sp>
+          <p:nvSpPr>
+            <p:cNvPr id="14" name="TextBox 13"/>
+            <p:cNvSpPr txBox="1"/>
+            <p:nvPr/>
+          </p:nvSpPr>
+          <p:spPr>
+            <a:xfrm>
+              <a:off x="2206095" y="2731912"/>
+              <a:ext cx="1296144" cy="523220"/>
+            </a:xfrm>
+            <a:prstGeom prst="rect">
+              <a:avLst/>
+            </a:prstGeom>
+            <a:noFill/>
+          </p:spPr>
+          <p:txBody>
+            <a:bodyPr wrap="square" rtlCol="0">
+              <a:spAutoFit/>
+            </a:bodyPr>
+            <a:lstStyle/>
+            <a:p>
+              <a:pPr algn="ctr"/>
+              <a:r>
+                <a:rPr lang="en-US" altLang="ko-KR" sz="1400" dirty="0" smtClean="0">
+                  <a:latin typeface="Georgia" pitchFamily="18" charset="0"/>
+                </a:rPr>
+                <a:t>Principal point</a:t>
+              </a:r>
+              <a:endParaRPr lang="ko-KR" altLang="en-US" sz="1400" dirty="0">
+                <a:latin typeface="Georgia" pitchFamily="18" charset="0"/>
+              </a:endParaRPr>
+            </a:p>
+          </p:txBody>
+        </p:sp>
+        <p:graphicFrame>
+          <p:nvGraphicFramePr>
+            <p:cNvPr id="15" name="Object 14"/>
+            <p:cNvGraphicFramePr>
+              <a:graphicFrameLocks noChangeAspect="1"/>
+            </p:cNvGraphicFramePr>
+            <p:nvPr/>
+          </p:nvGraphicFramePr>
+          <p:xfrm>
+            <a:off x="3059832" y="332656"/>
+            <a:ext cx="504056" cy="432048"/>
+          </p:xfrm>
+          <a:graphic>
+            <a:graphicData uri="http://schemas.openxmlformats.org/presentationml/2006/ole">
+              <p:oleObj spid="_x0000_s19458" name="Equation" r:id="rId4" imgW="266400" imgH="228600" progId="Equation.3">
+                <p:embed/>
+              </p:oleObj>
+            </a:graphicData>
+          </a:graphic>
+        </p:graphicFrame>
+        <p:graphicFrame>
+          <p:nvGraphicFramePr>
+            <p:cNvPr id="16" name="Object 3"/>
+            <p:cNvGraphicFramePr>
+              <a:graphicFrameLocks noChangeAspect="1"/>
+            </p:cNvGraphicFramePr>
+            <p:nvPr/>
+          </p:nvGraphicFramePr>
+          <p:xfrm>
+            <a:off x="3179837" y="1268760"/>
+            <a:ext cx="600075" cy="431800"/>
+          </p:xfrm>
+          <a:graphic>
+            <a:graphicData uri="http://schemas.openxmlformats.org/presentationml/2006/ole">
+              <p:oleObj spid="_x0000_s19459" name="Equation" r:id="rId5" imgW="317160" imgH="228600" progId="Equation.3">
+                <p:embed/>
+              </p:oleObj>
+            </a:graphicData>
+          </a:graphic>
+        </p:graphicFrame>
+        <p:graphicFrame>
+          <p:nvGraphicFramePr>
+            <p:cNvPr id="17" name="Object 4"/>
+            <p:cNvGraphicFramePr>
+              <a:graphicFrameLocks noChangeAspect="1"/>
+            </p:cNvGraphicFramePr>
+            <p:nvPr/>
+          </p:nvGraphicFramePr>
+          <p:xfrm>
+            <a:off x="3920138" y="3740782"/>
+            <a:ext cx="552450" cy="431800"/>
+          </p:xfrm>
+          <a:graphic>
+            <a:graphicData uri="http://schemas.openxmlformats.org/presentationml/2006/ole">
+              <p:oleObj spid="_x0000_s19460" name="Equation" r:id="rId6" imgW="291960" imgH="228600" progId="Equation.3">
+                <p:embed/>
+              </p:oleObj>
+            </a:graphicData>
+          </a:graphic>
+        </p:graphicFrame>
+      </p:grpSp>
+      <p:cxnSp>
+        <p:nvCxnSpPr>
+          <p:cNvPr id="19" name="Straight Arrow Connector 18"/>
+          <p:cNvCxnSpPr/>
+          <p:nvPr/>
+        </p:nvCxnSpPr>
+        <p:spPr>
+          <a:xfrm rot="5400000" flipH="1" flipV="1">
+            <a:off x="5184354" y="3427448"/>
+            <a:ext cx="2304256" cy="1588"/>
+          </a:xfrm>
+          <a:prstGeom prst="straightConnector1">
+            <a:avLst/>
+          </a:prstGeom>
+          <a:ln>
+            <a:tailEnd type="arrow" w="lg" len="lg"/>
+          </a:ln>
+        </p:spPr>
+        <p:style>
+          <a:lnRef idx="2">
+            <a:schemeClr val="dk1"/>
+          </a:lnRef>
+          <a:fillRef idx="0">
+            <a:schemeClr val="dk1"/>
+          </a:fillRef>
+          <a:effectRef idx="1">
+            <a:schemeClr val="dk1"/>
+          </a:effectRef>
+          <a:fontRef idx="minor">
+            <a:schemeClr val="tx1"/>
+          </a:fontRef>
+        </p:style>
+      </p:cxnSp>
+      <p:cxnSp>
+        <p:nvCxnSpPr>
+          <p:cNvPr id="20" name="Straight Arrow Connector 19"/>
+          <p:cNvCxnSpPr/>
+          <p:nvPr/>
+        </p:nvCxnSpPr>
+        <p:spPr>
+          <a:xfrm>
+            <a:off x="6347563" y="4581128"/>
+            <a:ext cx="2616925" cy="1588"/>
+          </a:xfrm>
+          <a:prstGeom prst="straightConnector1">
+            <a:avLst/>
+          </a:prstGeom>
+          <a:ln>
+            <a:tailEnd type="arrow" w="lg" len="lg"/>
+          </a:ln>
+        </p:spPr>
+        <p:style>
+          <a:lnRef idx="2">
+            <a:schemeClr val="dk1"/>
+          </a:lnRef>
+          <a:fillRef idx="0">
+            <a:schemeClr val="dk1"/>
+          </a:fillRef>
+          <a:effectRef idx="1">
+            <a:schemeClr val="dk1"/>
+          </a:effectRef>
+          <a:fontRef idx="minor">
+            <a:schemeClr val="tx1"/>
+          </a:fontRef>
+        </p:style>
+      </p:cxnSp>
+      <p:graphicFrame>
+        <p:nvGraphicFramePr>
+          <p:cNvPr id="28" name="Object 27"/>
+          <p:cNvGraphicFramePr>
+            <a:graphicFrameLocks noChangeAspect="1"/>
+          </p:cNvGraphicFramePr>
+          <p:nvPr/>
+        </p:nvGraphicFramePr>
+        <p:xfrm>
+          <a:off x="8352213" y="4569253"/>
+          <a:ext cx="649287" cy="431800"/>
+        </p:xfrm>
+        <a:graphic>
+          <a:graphicData uri="http://schemas.openxmlformats.org/presentationml/2006/ole">
+            <p:oleObj spid="_x0000_s19461" name="Equation" r:id="rId7" imgW="342720" imgH="228600" progId="Equation.3">
+              <p:embed/>
+            </p:oleObj>
+          </a:graphicData>
+        </a:graphic>
+      </p:graphicFrame>
+      <p:graphicFrame>
+        <p:nvGraphicFramePr>
+          <p:cNvPr id="29" name="Object 3"/>
+          <p:cNvGraphicFramePr>
+            <a:graphicFrameLocks noChangeAspect="1"/>
+          </p:cNvGraphicFramePr>
+          <p:nvPr/>
+        </p:nvGraphicFramePr>
+        <p:xfrm>
+          <a:off x="4763566" y="5732463"/>
+          <a:ext cx="744538" cy="431800"/>
+        </p:xfrm>
+        <a:graphic>
+          <a:graphicData uri="http://schemas.openxmlformats.org/presentationml/2006/ole">
+            <p:oleObj spid="_x0000_s19462" name="Equation" r:id="rId8" imgW="393480" imgH="228600" progId="Equation.3">
+              <p:embed/>
+            </p:oleObj>
+          </a:graphicData>
+        </a:graphic>
+      </p:graphicFrame>
+      <p:graphicFrame>
+        <p:nvGraphicFramePr>
+          <p:cNvPr id="30" name="Object 4"/>
+          <p:cNvGraphicFramePr>
+            <a:graphicFrameLocks noChangeAspect="1"/>
+          </p:cNvGraphicFramePr>
+          <p:nvPr/>
+        </p:nvGraphicFramePr>
+        <p:xfrm>
+          <a:off x="6395367" y="2204864"/>
+          <a:ext cx="696913" cy="431800"/>
+        </p:xfrm>
+        <a:graphic>
+          <a:graphicData uri="http://schemas.openxmlformats.org/presentationml/2006/ole">
+            <p:oleObj spid="_x0000_s19463" name="Equation" r:id="rId9" imgW="368280" imgH="228600" progId="Equation.3">
+              <p:embed/>
+            </p:oleObj>
+          </a:graphicData>
+        </a:graphic>
+      </p:graphicFrame>
+      <p:graphicFrame>
+        <p:nvGraphicFramePr>
+          <p:cNvPr id="19464" name="Object 8"/>
+          <p:cNvGraphicFramePr>
+            <a:graphicFrameLocks noChangeAspect="1"/>
+          </p:cNvGraphicFramePr>
+          <p:nvPr/>
+        </p:nvGraphicFramePr>
+        <p:xfrm>
+          <a:off x="1835696" y="5085184"/>
+          <a:ext cx="479425" cy="384175"/>
+        </p:xfrm>
+        <a:graphic>
+          <a:graphicData uri="http://schemas.openxmlformats.org/presentationml/2006/ole">
+            <p:oleObj spid="_x0000_s19464" name="Equation" r:id="rId10" imgW="253800" imgH="203040" progId="Equation.3">
+              <p:embed/>
+            </p:oleObj>
+          </a:graphicData>
+        </a:graphic>
+      </p:graphicFrame>
+      <p:sp>
+        <p:nvSpPr>
+          <p:cNvPr id="48" name="Bent Arrow 47"/>
+          <p:cNvSpPr/>
+          <p:nvPr/>
+        </p:nvSpPr>
+        <p:spPr>
+          <a:xfrm rot="16200000">
+            <a:off x="1439652" y="1592796"/>
+            <a:ext cx="2592288" cy="4248472"/>
+          </a:xfrm>
+          <a:prstGeom prst="bentArrow">
+            <a:avLst>
+              <a:gd name="adj1" fmla="val 11258"/>
+              <a:gd name="adj2" fmla="val 12173"/>
+              <a:gd name="adj3" fmla="val 15838"/>
+              <a:gd name="adj4" fmla="val 43292"/>
+            </a:avLst>
+          </a:prstGeom>
+        </p:spPr>
+        <p:style>
+          <a:lnRef idx="3">
+            <a:schemeClr val="lt1"/>
+          </a:lnRef>
+          <a:fillRef idx="1">
+            <a:schemeClr val="dk1"/>
+          </a:fillRef>
+          <a:effectRef idx="1">
+            <a:schemeClr val="dk1"/>
+          </a:effectRef>
+          <a:fontRef idx="minor">
+            <a:schemeClr val="lt1"/>
+          </a:fontRef>
+        </p:style>
+        <p:txBody>
+          <a:bodyPr rtlCol="0" anchor="ctr"/>
+          <a:lstStyle/>
+          <a:p>
+            <a:pPr algn="ctr"/>
+            <a:endParaRPr lang="ko-KR" altLang="en-US">
+              <a:solidFill>
+                <a:schemeClr val="tx1"/>
+              </a:solidFill>
+            </a:endParaRPr>
+          </a:p>
+        </p:txBody>
+      </p:sp>
+      <p:sp>
+        <p:nvSpPr>
+          <p:cNvPr id="50" name="TextBox 49"/>
+          <p:cNvSpPr txBox="1"/>
+          <p:nvPr/>
+        </p:nvSpPr>
+        <p:spPr>
+          <a:xfrm>
+            <a:off x="3635896" y="2113111"/>
+            <a:ext cx="1296144" cy="307777"/>
+          </a:xfrm>
+          <a:prstGeom prst="rect">
+            <a:avLst/>
+          </a:prstGeom>
+          <a:noFill/>
+        </p:spPr>
+        <p:txBody>
+          <a:bodyPr wrap="square" rtlCol="0">
+            <a:spAutoFit/>
+          </a:bodyPr>
+          <a:lstStyle/>
+          <a:p>
+            <a:pPr algn="ctr"/>
+            <a:r>
+              <a:rPr lang="en-US" altLang="ko-KR" sz="1400" dirty="0" smtClean="0">
+                <a:latin typeface="Georgia" pitchFamily="18" charset="0"/>
+              </a:rPr>
+              <a:t>Image plane</a:t>
+            </a:r>
+            <a:endParaRPr lang="ko-KR" altLang="en-US" sz="1400" dirty="0">
+              <a:latin typeface="Georgia" pitchFamily="18" charset="0"/>
+            </a:endParaRPr>
+          </a:p>
+        </p:txBody>
+      </p:sp>
     </p:spTree>
   </p:cSld>
   <p:clrMapOvr>

</xml_diff>